<commit_message>
Add Icons Update Map
</commit_message>
<xml_diff>
--- a/Were Moving Folder/Transition Elements.pptx
+++ b/Were Moving Folder/Transition Elements.pptx
@@ -216,7 +216,7 @@
           <a:p>
             <a:fld id="{939C3683-6F67-42FF-A4EB-CE07764678A8}" type="datetimeFigureOut">
               <a:rPr lang="en-US" smtClean="0"/>
-              <a:t>12/15/2017</a:t>
+              <a:t>12/18/2017</a:t>
             </a:fld>
             <a:endParaRPr lang="en-US"/>
           </a:p>
@@ -1172,7 +1172,7 @@
           <a:p>
             <a:fld id="{E9EC8B0C-94A6-4E2A-AD9D-DC395D906229}" type="datetimeFigureOut">
               <a:rPr lang="en-US" smtClean="0"/>
-              <a:t>12/15/2017</a:t>
+              <a:t>12/18/2017</a:t>
             </a:fld>
             <a:endParaRPr lang="en-US"/>
           </a:p>
@@ -1421,7 +1421,7 @@
               <a:buNone/>
               <a:defRPr>
                 <a:solidFill>
-                  <a:srgbClr val="008599"/>
+                  <a:srgbClr val="00AAA0"/>
                 </a:solidFill>
                 <a:latin typeface="Arial"/>
                 <a:cs typeface="Arial"/>
@@ -1432,7 +1432,7 @@
               <a:buNone/>
               <a:defRPr>
                 <a:solidFill>
-                  <a:srgbClr val="646469"/>
+                  <a:srgbClr val="00AAA0"/>
                 </a:solidFill>
                 <a:latin typeface="Arial"/>
                 <a:cs typeface="Arial"/>
@@ -1443,7 +1443,7 @@
               <a:buNone/>
               <a:defRPr>
                 <a:solidFill>
-                  <a:srgbClr val="646469"/>
+                  <a:srgbClr val="00AAA0"/>
                 </a:solidFill>
                 <a:latin typeface="Arial"/>
                 <a:cs typeface="Arial"/>
@@ -1454,7 +1454,7 @@
               <a:buNone/>
               <a:defRPr>
                 <a:solidFill>
-                  <a:srgbClr val="646469"/>
+                  <a:srgbClr val="00AAA0"/>
                 </a:solidFill>
                 <a:latin typeface="Arial"/>
                 <a:cs typeface="Arial"/>
@@ -1465,7 +1465,7 @@
               <a:buNone/>
               <a:defRPr>
                 <a:solidFill>
-                  <a:srgbClr val="646469"/>
+                  <a:srgbClr val="00AAA0"/>
                 </a:solidFill>
                 <a:latin typeface="Arial"/>
                 <a:cs typeface="Arial"/>
@@ -1860,7 +1860,7 @@
           <a:p>
             <a:fld id="{E9EC8B0C-94A6-4E2A-AD9D-DC395D906229}" type="datetimeFigureOut">
               <a:rPr lang="en-US" smtClean="0"/>
-              <a:t>12/15/2017</a:t>
+              <a:t>12/18/2017</a:t>
             </a:fld>
             <a:endParaRPr lang="en-US"/>
           </a:p>
@@ -3059,7 +3059,7 @@
           <a:p>
             <a:fld id="{E9EC8B0C-94A6-4E2A-AD9D-DC395D906229}" type="datetimeFigureOut">
               <a:rPr lang="en-US" smtClean="0"/>
-              <a:t>12/15/2017</a:t>
+              <a:t>12/18/2017</a:t>
             </a:fld>
             <a:endParaRPr lang="en-US"/>
           </a:p>
@@ -3211,7 +3211,7 @@
           <a:p>
             <a:fld id="{E9EC8B0C-94A6-4E2A-AD9D-DC395D906229}" type="datetimeFigureOut">
               <a:rPr lang="en-US" smtClean="0"/>
-              <a:t>12/15/2017</a:t>
+              <a:t>12/18/2017</a:t>
             </a:fld>
             <a:endParaRPr lang="en-US"/>
           </a:p>
@@ -3481,7 +3481,7 @@
           <a:p>
             <a:fld id="{E9EC8B0C-94A6-4E2A-AD9D-DC395D906229}" type="datetimeFigureOut">
               <a:rPr lang="en-US" smtClean="0"/>
-              <a:t>12/15/2017</a:t>
+              <a:t>12/18/2017</a:t>
             </a:fld>
             <a:endParaRPr lang="en-US"/>
           </a:p>
@@ -4594,6 +4594,9 @@
           <a:solidFill>
             <a:srgbClr val="C00000"/>
           </a:solidFill>
+          <a:ln>
+            <a:noFill/>
+          </a:ln>
         </p:spPr>
         <p:style>
           <a:lnRef idx="2">
@@ -4671,6 +4674,9 @@
           <a:solidFill>
             <a:srgbClr val="C00000"/>
           </a:solidFill>
+          <a:ln>
+            <a:noFill/>
+          </a:ln>
         </p:spPr>
         <p:style>
           <a:lnRef idx="2">
@@ -5066,23 +5072,7 @@
                   <a:schemeClr val="bg1"/>
                 </a:solidFill>
               </a:rPr>
-              <a:t>Visitor and </a:t>
-            </a:r>
-            <a:r>
-              <a:rPr lang="en-US" sz="3200" b="1" dirty="0" smtClean="0">
-                <a:solidFill>
-                  <a:schemeClr val="bg1"/>
-                </a:solidFill>
-              </a:rPr>
-              <a:t>Patient </a:t>
-            </a:r>
-            <a:r>
-              <a:rPr lang="en-US" sz="3200" b="1" dirty="0" smtClean="0">
-                <a:solidFill>
-                  <a:schemeClr val="bg1"/>
-                </a:solidFill>
-              </a:rPr>
-              <a:t>Shuttle</a:t>
+              <a:t>Visitor and Patient Shuttle</a:t>
             </a:r>
             <a:endParaRPr lang="en-US" sz="3200" b="1" dirty="0">
               <a:solidFill>
@@ -5124,77 +5114,6 @@
       </p:grpSpPr>
       <p:sp>
         <p:nvSpPr>
-          <p:cNvPr id="7" name="Text Placeholder 6"/>
-          <p:cNvSpPr>
-            <a:spLocks noGrp="1"/>
-          </p:cNvSpPr>
-          <p:nvPr>
-            <p:ph type="body" idx="1"/>
-          </p:nvPr>
-        </p:nvSpPr>
-        <p:spPr>
-          <a:xfrm>
-            <a:off x="691175" y="1471125"/>
-            <a:ext cx="5259459" cy="2777318"/>
-          </a:xfrm>
-        </p:spPr>
-        <p:txBody>
-          <a:bodyPr/>
-          <a:lstStyle/>
-          <a:p>
-            <a:r>
-              <a:rPr lang="en-US" dirty="0" smtClean="0"/>
-              <a:t>As of August 25</a:t>
-            </a:r>
-            <a:r>
-              <a:rPr lang="en-US" baseline="30000" dirty="0" smtClean="0"/>
-              <a:t>th</a:t>
-            </a:r>
-            <a:r>
-              <a:rPr lang="en-US" dirty="0" smtClean="0"/>
-              <a:t> XXXXXXXX </a:t>
-            </a:r>
-            <a:br>
-              <a:rPr lang="en-US" dirty="0" smtClean="0"/>
-            </a:br>
-            <a:r>
-              <a:rPr lang="en-US" dirty="0" smtClean="0"/>
-              <a:t>will be located in the:</a:t>
-            </a:r>
-            <a:br>
-              <a:rPr lang="en-US" dirty="0" smtClean="0"/>
-            </a:br>
-            <a:endParaRPr lang="en-US" sz="1050" dirty="0" smtClean="0"/>
-          </a:p>
-          <a:p>
-            <a:r>
-              <a:rPr lang="en-US" dirty="0" err="1" smtClean="0"/>
-              <a:t>Monteagle</a:t>
-            </a:r>
-            <a:r>
-              <a:rPr lang="en-US" dirty="0" smtClean="0"/>
-              <a:t> Building</a:t>
-            </a:r>
-            <a:br>
-              <a:rPr lang="en-US" dirty="0" smtClean="0"/>
-            </a:br>
-            <a:r>
-              <a:rPr lang="en-US" dirty="0" smtClean="0"/>
-              <a:t>Floor X, </a:t>
-            </a:r>
-            <a:br>
-              <a:rPr lang="en-US" dirty="0" smtClean="0"/>
-            </a:br>
-            <a:r>
-              <a:rPr lang="en-US" dirty="0" smtClean="0"/>
-              <a:t>Room XXX</a:t>
-            </a:r>
-            <a:endParaRPr lang="en-US" dirty="0"/>
-          </a:p>
-        </p:txBody>
-      </p:sp>
-      <p:sp>
-        <p:nvSpPr>
           <p:cNvPr id="8" name="Title 7"/>
           <p:cNvSpPr>
             <a:spLocks noGrp="1"/>
@@ -5203,12 +5122,7 @@
             <p:ph type="title"/>
           </p:nvPr>
         </p:nvSpPr>
-        <p:spPr>
-          <a:xfrm>
-            <a:off x="691174" y="363416"/>
-            <a:ext cx="5357935" cy="1080721"/>
-          </a:xfrm>
-        </p:spPr>
+        <p:spPr/>
         <p:txBody>
           <a:bodyPr/>
           <a:lstStyle/>
@@ -5218,6 +5132,75 @@
               <a:t>We’re Moving</a:t>
             </a:r>
             <a:endParaRPr lang="en-US" dirty="0"/>
+          </a:p>
+        </p:txBody>
+      </p:sp>
+      <p:sp>
+        <p:nvSpPr>
+          <p:cNvPr id="7" name="Text Placeholder 6"/>
+          <p:cNvSpPr>
+            <a:spLocks noGrp="1"/>
+          </p:cNvSpPr>
+          <p:nvPr>
+            <p:ph type="body" sz="quarter" idx="10"/>
+          </p:nvPr>
+        </p:nvSpPr>
+        <p:spPr>
+          <a:xfrm>
+            <a:off x="661473" y="1793965"/>
+            <a:ext cx="5587816" cy="5022198"/>
+          </a:xfrm>
+        </p:spPr>
+        <p:txBody>
+          <a:bodyPr>
+            <a:normAutofit/>
+          </a:bodyPr>
+          <a:lstStyle/>
+          <a:p>
+            <a:r>
+              <a:rPr lang="en-US" dirty="0"/>
+              <a:t>As of August 25th XXXXXXXX </a:t>
+            </a:r>
+            <a:br>
+              <a:rPr lang="en-US" dirty="0"/>
+            </a:br>
+            <a:r>
+              <a:rPr lang="en-US" dirty="0"/>
+              <a:t>will be located in the:</a:t>
+            </a:r>
+            <a:br>
+              <a:rPr lang="en-US" dirty="0"/>
+            </a:br>
+            <a:endParaRPr lang="en-US" dirty="0"/>
+          </a:p>
+          <a:p>
+            <a:r>
+              <a:rPr lang="en-US" b="1" dirty="0" err="1"/>
+              <a:t>Monteagle</a:t>
+            </a:r>
+            <a:r>
+              <a:rPr lang="en-US" b="1" dirty="0"/>
+              <a:t> Building</a:t>
+            </a:r>
+            <a:r>
+              <a:rPr lang="en-US" dirty="0"/>
+              <a:t/>
+            </a:r>
+            <a:br>
+              <a:rPr lang="en-US" dirty="0"/>
+            </a:br>
+            <a:r>
+              <a:rPr lang="en-US" sz="2400" dirty="0"/>
+              <a:t>Floor X, </a:t>
+            </a:r>
+            <a:br>
+              <a:rPr lang="en-US" sz="2400" dirty="0"/>
+            </a:br>
+            <a:r>
+              <a:rPr lang="en-US" sz="2400" dirty="0"/>
+              <a:t>Room XXX</a:t>
+            </a:r>
+            <a:endParaRPr lang="en-US" sz="2400" dirty="0"/>
           </a:p>
         </p:txBody>
       </p:sp>
@@ -5425,73 +5408,6 @@
       </p:pic>
       <p:sp>
         <p:nvSpPr>
-          <p:cNvPr id="7" name="Text Placeholder 6"/>
-          <p:cNvSpPr>
-            <a:spLocks noGrp="1"/>
-          </p:cNvSpPr>
-          <p:nvPr>
-            <p:ph type="body" idx="1"/>
-          </p:nvPr>
-        </p:nvSpPr>
-        <p:spPr>
-          <a:xfrm>
-            <a:off x="691175" y="1471125"/>
-            <a:ext cx="5259459" cy="2777318"/>
-          </a:xfrm>
-        </p:spPr>
-        <p:txBody>
-          <a:bodyPr/>
-          <a:lstStyle/>
-          <a:p>
-            <a:r>
-              <a:rPr lang="en-US" dirty="0" smtClean="0"/>
-              <a:t>As of August 25</a:t>
-            </a:r>
-            <a:r>
-              <a:rPr lang="en-US" baseline="30000" dirty="0" smtClean="0"/>
-              <a:t>th</a:t>
-            </a:r>
-            <a:r>
-              <a:rPr lang="en-US" dirty="0" smtClean="0"/>
-              <a:t> XXXXXXXXX </a:t>
-            </a:r>
-            <a:br>
-              <a:rPr lang="en-US" dirty="0" smtClean="0"/>
-            </a:br>
-            <a:r>
-              <a:rPr lang="en-US" dirty="0" smtClean="0"/>
-              <a:t>will be located in the:</a:t>
-            </a:r>
-            <a:br>
-              <a:rPr lang="en-US" dirty="0" smtClean="0"/>
-            </a:br>
-            <a:endParaRPr lang="en-US" sz="1050" dirty="0" smtClean="0"/>
-          </a:p>
-          <a:p>
-            <a:r>
-              <a:rPr lang="en-US" dirty="0" smtClean="0"/>
-              <a:t>1912 Building</a:t>
-            </a:r>
-            <a:br>
-              <a:rPr lang="en-US" dirty="0" smtClean="0"/>
-            </a:br>
-            <a:r>
-              <a:rPr lang="en-US" dirty="0" smtClean="0"/>
-              <a:t>Floor X, </a:t>
-            </a:r>
-            <a:br>
-              <a:rPr lang="en-US" dirty="0" smtClean="0"/>
-            </a:br>
-            <a:r>
-              <a:rPr lang="en-US" dirty="0" smtClean="0"/>
-              <a:t>Room XXX</a:t>
-            </a:r>
-            <a:endParaRPr lang="en-US" dirty="0"/>
-          </a:p>
-        </p:txBody>
-      </p:sp>
-      <p:sp>
-        <p:nvSpPr>
           <p:cNvPr id="8" name="Title 7"/>
           <p:cNvSpPr>
             <a:spLocks noGrp="1"/>
@@ -5500,12 +5416,7 @@
             <p:ph type="title"/>
           </p:nvPr>
         </p:nvSpPr>
-        <p:spPr>
-          <a:xfrm>
-            <a:off x="691174" y="363416"/>
-            <a:ext cx="5357935" cy="1080721"/>
-          </a:xfrm>
-        </p:spPr>
+        <p:spPr/>
         <p:txBody>
           <a:bodyPr/>
           <a:lstStyle/>
@@ -5515,6 +5426,79 @@
               <a:t>We’re Moving</a:t>
             </a:r>
             <a:endParaRPr lang="en-US" dirty="0"/>
+          </a:p>
+        </p:txBody>
+      </p:sp>
+      <p:sp>
+        <p:nvSpPr>
+          <p:cNvPr id="7" name="Text Placeholder 6"/>
+          <p:cNvSpPr>
+            <a:spLocks noGrp="1"/>
+          </p:cNvSpPr>
+          <p:nvPr>
+            <p:ph type="body" sz="quarter" idx="10"/>
+          </p:nvPr>
+        </p:nvSpPr>
+        <p:spPr>
+          <a:xfrm>
+            <a:off x="661473" y="1793965"/>
+            <a:ext cx="5757800" cy="4874690"/>
+          </a:xfrm>
+        </p:spPr>
+        <p:txBody>
+          <a:bodyPr>
+            <a:normAutofit/>
+          </a:bodyPr>
+          <a:lstStyle/>
+          <a:p>
+            <a:r>
+              <a:rPr lang="en-US" dirty="0" smtClean="0"/>
+              <a:t>As of August 25</a:t>
+            </a:r>
+            <a:r>
+              <a:rPr lang="en-US" baseline="30000" dirty="0" smtClean="0"/>
+              <a:t>th</a:t>
+            </a:r>
+            <a:r>
+              <a:rPr lang="en-US" dirty="0" smtClean="0"/>
+              <a:t> XXXXXXXXX </a:t>
+            </a:r>
+            <a:br>
+              <a:rPr lang="en-US" dirty="0" smtClean="0"/>
+            </a:br>
+            <a:r>
+              <a:rPr lang="en-US" dirty="0"/>
+              <a:t>will be located in the:</a:t>
+            </a:r>
+            <a:br>
+              <a:rPr lang="en-US" dirty="0"/>
+            </a:br>
+            <a:endParaRPr lang="en-US" dirty="0"/>
+          </a:p>
+          <a:p>
+            <a:r>
+              <a:rPr lang="en-US" b="1" dirty="0" smtClean="0"/>
+              <a:t>1912 </a:t>
+            </a:r>
+            <a:r>
+              <a:rPr lang="en-US" b="1" dirty="0" smtClean="0"/>
+              <a:t>Building</a:t>
+            </a:r>
+            <a:br>
+              <a:rPr lang="en-US" b="1" dirty="0" smtClean="0"/>
+            </a:br>
+            <a:r>
+              <a:rPr lang="en-US" sz="2400" dirty="0" smtClean="0"/>
+              <a:t>Floor X, </a:t>
+            </a:r>
+            <a:br>
+              <a:rPr lang="en-US" sz="2400" dirty="0" smtClean="0"/>
+            </a:br>
+            <a:r>
+              <a:rPr lang="en-US" sz="2400" dirty="0" smtClean="0"/>
+              <a:t>Room XXX</a:t>
+            </a:r>
+            <a:endParaRPr lang="en-US" sz="2400" dirty="0"/>
           </a:p>
         </p:txBody>
       </p:sp>
@@ -5678,73 +5662,6 @@
       </p:pic>
       <p:sp>
         <p:nvSpPr>
-          <p:cNvPr id="7" name="Text Placeholder 6"/>
-          <p:cNvSpPr>
-            <a:spLocks noGrp="1"/>
-          </p:cNvSpPr>
-          <p:nvPr>
-            <p:ph type="body" idx="1"/>
-          </p:nvPr>
-        </p:nvSpPr>
-        <p:spPr>
-          <a:xfrm>
-            <a:off x="691175" y="1471125"/>
-            <a:ext cx="5259459" cy="2777318"/>
-          </a:xfrm>
-        </p:spPr>
-        <p:txBody>
-          <a:bodyPr/>
-          <a:lstStyle/>
-          <a:p>
-            <a:r>
-              <a:rPr lang="en-US" dirty="0" smtClean="0"/>
-              <a:t>As of August 25</a:t>
-            </a:r>
-            <a:r>
-              <a:rPr lang="en-US" baseline="30000" dirty="0" smtClean="0"/>
-              <a:t>th</a:t>
-            </a:r>
-            <a:r>
-              <a:rPr lang="en-US" dirty="0" smtClean="0"/>
-              <a:t> XXXXXXXXX </a:t>
-            </a:r>
-            <a:br>
-              <a:rPr lang="en-US" dirty="0" smtClean="0"/>
-            </a:br>
-            <a:r>
-              <a:rPr lang="en-US" dirty="0" smtClean="0"/>
-              <a:t>will be located in the:</a:t>
-            </a:r>
-            <a:br>
-              <a:rPr lang="en-US" dirty="0" smtClean="0"/>
-            </a:br>
-            <a:endParaRPr lang="en-US" sz="1050" dirty="0" smtClean="0"/>
-          </a:p>
-          <a:p>
-            <a:r>
-              <a:rPr lang="en-US" dirty="0" smtClean="0"/>
-              <a:t>1957 Building</a:t>
-            </a:r>
-            <a:br>
-              <a:rPr lang="en-US" dirty="0" smtClean="0"/>
-            </a:br>
-            <a:r>
-              <a:rPr lang="en-US" dirty="0" smtClean="0"/>
-              <a:t>Floor X, </a:t>
-            </a:r>
-            <a:br>
-              <a:rPr lang="en-US" dirty="0" smtClean="0"/>
-            </a:br>
-            <a:r>
-              <a:rPr lang="en-US" dirty="0" smtClean="0"/>
-              <a:t>Room XXX</a:t>
-            </a:r>
-            <a:endParaRPr lang="en-US" dirty="0"/>
-          </a:p>
-        </p:txBody>
-      </p:sp>
-      <p:sp>
-        <p:nvSpPr>
           <p:cNvPr id="8" name="Title 7"/>
           <p:cNvSpPr>
             <a:spLocks noGrp="1"/>
@@ -5753,12 +5670,7 @@
             <p:ph type="title"/>
           </p:nvPr>
         </p:nvSpPr>
-        <p:spPr>
-          <a:xfrm>
-            <a:off x="691174" y="363416"/>
-            <a:ext cx="5357935" cy="1080721"/>
-          </a:xfrm>
-        </p:spPr>
+        <p:spPr/>
         <p:txBody>
           <a:bodyPr/>
           <a:lstStyle/>
@@ -5768,6 +5680,67 @@
               <a:t>We’re Moving</a:t>
             </a:r>
             <a:endParaRPr lang="en-US" dirty="0"/>
+          </a:p>
+        </p:txBody>
+      </p:sp>
+      <p:sp>
+        <p:nvSpPr>
+          <p:cNvPr id="7" name="Text Placeholder 6"/>
+          <p:cNvSpPr>
+            <a:spLocks noGrp="1"/>
+          </p:cNvSpPr>
+          <p:nvPr>
+            <p:ph type="body" sz="quarter" idx="10"/>
+          </p:nvPr>
+        </p:nvSpPr>
+        <p:spPr>
+          <a:xfrm>
+            <a:off x="661473" y="1793964"/>
+            <a:ext cx="5587816" cy="4653017"/>
+          </a:xfrm>
+        </p:spPr>
+        <p:txBody>
+          <a:bodyPr>
+            <a:normAutofit/>
+          </a:bodyPr>
+          <a:lstStyle/>
+          <a:p>
+            <a:r>
+              <a:rPr lang="en-US" dirty="0"/>
+              <a:t>As of August 25th XXXXXXXXX </a:t>
+            </a:r>
+            <a:br>
+              <a:rPr lang="en-US" dirty="0"/>
+            </a:br>
+            <a:r>
+              <a:rPr lang="en-US" dirty="0"/>
+              <a:t>will be located in the:</a:t>
+            </a:r>
+            <a:br>
+              <a:rPr lang="en-US" dirty="0"/>
+            </a:br>
+            <a:endParaRPr lang="en-US" dirty="0"/>
+          </a:p>
+          <a:p>
+            <a:r>
+              <a:rPr lang="en-US" b="1" dirty="0"/>
+              <a:t>1957 Building</a:t>
+            </a:r>
+            <a:br>
+              <a:rPr lang="en-US" b="1" dirty="0"/>
+            </a:br>
+            <a:r>
+              <a:rPr lang="en-US" sz="2400" dirty="0"/>
+              <a:t>Floor X, </a:t>
+            </a:r>
+            <a:br>
+              <a:rPr lang="en-US" sz="2400" dirty="0"/>
+            </a:br>
+            <a:r>
+              <a:rPr lang="en-US" sz="2400" dirty="0"/>
+              <a:t>Room XXX</a:t>
+            </a:r>
+            <a:endParaRPr lang="en-US" sz="2400" dirty="0"/>
           </a:p>
         </p:txBody>
       </p:sp>
@@ -6588,306 +6561,117 @@
       </p:sp>
       <p:sp>
         <p:nvSpPr>
-          <p:cNvPr id="31" name="Text Placeholder 6"/>
-          <p:cNvSpPr txBox="1">
-            <a:spLocks/>
+          <p:cNvPr id="3" name="Title 2"/>
+          <p:cNvSpPr>
+            <a:spLocks noGrp="1"/>
           </p:cNvSpPr>
-          <p:nvPr/>
-        </p:nvSpPr>
-        <p:spPr>
-          <a:xfrm>
-            <a:off x="691175" y="1471125"/>
-            <a:ext cx="5259459" cy="2777318"/>
-          </a:xfrm>
-          <a:prstGeom prst="rect">
-            <a:avLst/>
-          </a:prstGeom>
+          <p:nvPr>
+            <p:ph type="title"/>
+          </p:nvPr>
+        </p:nvSpPr>
+        <p:spPr>
+          <a:xfrm>
+            <a:off x="661474" y="-47264"/>
+            <a:ext cx="10726210" cy="1841229"/>
+          </a:xfrm>
         </p:spPr>
         <p:txBody>
           <a:bodyPr/>
-          <a:lstStyle>
-            <a:lvl1pPr marL="228600" indent="-228600" algn="l" defTabSz="914400" rtl="0" eaLnBrk="1" latinLnBrk="0" hangingPunct="1">
-              <a:lnSpc>
-                <a:spcPct val="90000"/>
-              </a:lnSpc>
-              <a:spcBef>
-                <a:spcPts val="1000"/>
-              </a:spcBef>
-              <a:buFont typeface="Arial" panose="020B0604020202020204" pitchFamily="34" charset="0"/>
-              <a:buChar char="•"/>
-              <a:defRPr sz="2800" kern="1200">
-                <a:solidFill>
-                  <a:schemeClr val="tx1">
-                    <a:lumMod val="65000"/>
-                    <a:lumOff val="35000"/>
-                  </a:schemeClr>
-                </a:solidFill>
-                <a:latin typeface="+mn-lt"/>
-                <a:ea typeface="+mn-ea"/>
-                <a:cs typeface="+mn-cs"/>
-              </a:defRPr>
-            </a:lvl1pPr>
-            <a:lvl2pPr marL="685800" indent="-228600" algn="l" defTabSz="914400" rtl="0" eaLnBrk="1" latinLnBrk="0" hangingPunct="1">
-              <a:lnSpc>
-                <a:spcPct val="90000"/>
-              </a:lnSpc>
-              <a:spcBef>
-                <a:spcPts val="500"/>
-              </a:spcBef>
-              <a:buFont typeface="Arial" panose="020B0604020202020204" pitchFamily="34" charset="0"/>
-              <a:buChar char="•"/>
-              <a:defRPr sz="2400" kern="1200">
-                <a:solidFill>
-                  <a:schemeClr val="tx1">
-                    <a:lumMod val="65000"/>
-                    <a:lumOff val="35000"/>
-                  </a:schemeClr>
-                </a:solidFill>
-                <a:latin typeface="+mn-lt"/>
-                <a:ea typeface="+mn-ea"/>
-                <a:cs typeface="+mn-cs"/>
-              </a:defRPr>
-            </a:lvl2pPr>
-            <a:lvl3pPr marL="1143000" indent="-228600" algn="l" defTabSz="914400" rtl="0" eaLnBrk="1" latinLnBrk="0" hangingPunct="1">
-              <a:lnSpc>
-                <a:spcPct val="90000"/>
-              </a:lnSpc>
-              <a:spcBef>
-                <a:spcPts val="500"/>
-              </a:spcBef>
-              <a:buFont typeface="Arial" panose="020B0604020202020204" pitchFamily="34" charset="0"/>
-              <a:buChar char="•"/>
-              <a:defRPr sz="2000" kern="1200">
-                <a:solidFill>
-                  <a:schemeClr val="tx1">
-                    <a:lumMod val="65000"/>
-                    <a:lumOff val="35000"/>
-                  </a:schemeClr>
-                </a:solidFill>
-                <a:latin typeface="+mn-lt"/>
-                <a:ea typeface="+mn-ea"/>
-                <a:cs typeface="+mn-cs"/>
-              </a:defRPr>
-            </a:lvl3pPr>
-            <a:lvl4pPr marL="1600200" indent="-228600" algn="l" defTabSz="914400" rtl="0" eaLnBrk="1" latinLnBrk="0" hangingPunct="1">
-              <a:lnSpc>
-                <a:spcPct val="90000"/>
-              </a:lnSpc>
-              <a:spcBef>
-                <a:spcPts val="500"/>
-              </a:spcBef>
-              <a:buFont typeface="Arial" panose="020B0604020202020204" pitchFamily="34" charset="0"/>
-              <a:buChar char="•"/>
-              <a:defRPr sz="1800" kern="1200">
-                <a:solidFill>
-                  <a:schemeClr val="tx1">
-                    <a:lumMod val="65000"/>
-                    <a:lumOff val="35000"/>
-                  </a:schemeClr>
-                </a:solidFill>
-                <a:latin typeface="+mn-lt"/>
-                <a:ea typeface="+mn-ea"/>
-                <a:cs typeface="+mn-cs"/>
-              </a:defRPr>
-            </a:lvl4pPr>
-            <a:lvl5pPr marL="2057400" indent="-228600" algn="l" defTabSz="914400" rtl="0" eaLnBrk="1" latinLnBrk="0" hangingPunct="1">
-              <a:lnSpc>
-                <a:spcPct val="90000"/>
-              </a:lnSpc>
-              <a:spcBef>
-                <a:spcPts val="500"/>
-              </a:spcBef>
-              <a:buFont typeface="Arial" panose="020B0604020202020204" pitchFamily="34" charset="0"/>
-              <a:buChar char="•"/>
-              <a:defRPr sz="1800" kern="1200">
-                <a:solidFill>
-                  <a:schemeClr val="tx1">
-                    <a:lumMod val="65000"/>
-                    <a:lumOff val="35000"/>
-                  </a:schemeClr>
-                </a:solidFill>
-                <a:latin typeface="+mn-lt"/>
-                <a:ea typeface="+mn-ea"/>
-                <a:cs typeface="+mn-cs"/>
-              </a:defRPr>
-            </a:lvl5pPr>
-            <a:lvl6pPr marL="2514600" indent="-228600" algn="l" defTabSz="914400" rtl="0" eaLnBrk="1" latinLnBrk="0" hangingPunct="1">
-              <a:lnSpc>
-                <a:spcPct val="90000"/>
-              </a:lnSpc>
-              <a:spcBef>
-                <a:spcPts val="500"/>
-              </a:spcBef>
-              <a:buFont typeface="Arial" panose="020B0604020202020204" pitchFamily="34" charset="0"/>
-              <a:buChar char="•"/>
-              <a:defRPr sz="1800" kern="1200">
-                <a:solidFill>
-                  <a:schemeClr val="tx1"/>
-                </a:solidFill>
-                <a:latin typeface="+mn-lt"/>
-                <a:ea typeface="+mn-ea"/>
-                <a:cs typeface="+mn-cs"/>
-              </a:defRPr>
-            </a:lvl6pPr>
-            <a:lvl7pPr marL="2971800" indent="-228600" algn="l" defTabSz="914400" rtl="0" eaLnBrk="1" latinLnBrk="0" hangingPunct="1">
-              <a:lnSpc>
-                <a:spcPct val="90000"/>
-              </a:lnSpc>
-              <a:spcBef>
-                <a:spcPts val="500"/>
-              </a:spcBef>
-              <a:buFont typeface="Arial" panose="020B0604020202020204" pitchFamily="34" charset="0"/>
-              <a:buChar char="•"/>
-              <a:defRPr sz="1800" kern="1200">
-                <a:solidFill>
-                  <a:schemeClr val="tx1"/>
-                </a:solidFill>
-                <a:latin typeface="+mn-lt"/>
-                <a:ea typeface="+mn-ea"/>
-                <a:cs typeface="+mn-cs"/>
-              </a:defRPr>
-            </a:lvl7pPr>
-            <a:lvl8pPr marL="3429000" indent="-228600" algn="l" defTabSz="914400" rtl="0" eaLnBrk="1" latinLnBrk="0" hangingPunct="1">
-              <a:lnSpc>
-                <a:spcPct val="90000"/>
-              </a:lnSpc>
-              <a:spcBef>
-                <a:spcPts val="500"/>
-              </a:spcBef>
-              <a:buFont typeface="Arial" panose="020B0604020202020204" pitchFamily="34" charset="0"/>
-              <a:buChar char="•"/>
-              <a:defRPr sz="1800" kern="1200">
-                <a:solidFill>
-                  <a:schemeClr val="tx1"/>
-                </a:solidFill>
-                <a:latin typeface="+mn-lt"/>
-                <a:ea typeface="+mn-ea"/>
-                <a:cs typeface="+mn-cs"/>
-              </a:defRPr>
-            </a:lvl8pPr>
-            <a:lvl9pPr marL="3886200" indent="-228600" algn="l" defTabSz="914400" rtl="0" eaLnBrk="1" latinLnBrk="0" hangingPunct="1">
-              <a:lnSpc>
-                <a:spcPct val="90000"/>
-              </a:lnSpc>
-              <a:spcBef>
-                <a:spcPts val="500"/>
-              </a:spcBef>
-              <a:buFont typeface="Arial" panose="020B0604020202020204" pitchFamily="34" charset="0"/>
-              <a:buChar char="•"/>
-              <a:defRPr sz="1800" kern="1200">
-                <a:solidFill>
-                  <a:schemeClr val="tx1"/>
-                </a:solidFill>
-                <a:latin typeface="+mn-lt"/>
-                <a:ea typeface="+mn-ea"/>
-                <a:cs typeface="+mn-cs"/>
-              </a:defRPr>
-            </a:lvl9pPr>
-          </a:lstStyle>
+          <a:lstStyle/>
           <a:p>
             <a:r>
               <a:rPr lang="en-US" dirty="0" smtClean="0"/>
+              <a:t>We’re Moving</a:t>
+            </a:r>
+            <a:endParaRPr lang="en-US" dirty="0"/>
+          </a:p>
+        </p:txBody>
+      </p:sp>
+      <p:sp>
+        <p:nvSpPr>
+          <p:cNvPr id="4" name="Text Placeholder 3"/>
+          <p:cNvSpPr>
+            <a:spLocks noGrp="1"/>
+          </p:cNvSpPr>
+          <p:nvPr>
+            <p:ph type="body" sz="quarter" idx="10"/>
+          </p:nvPr>
+        </p:nvSpPr>
+        <p:spPr>
+          <a:xfrm>
+            <a:off x="661473" y="1793965"/>
+            <a:ext cx="5194382" cy="4828508"/>
+          </a:xfrm>
+        </p:spPr>
+        <p:txBody>
+          <a:bodyPr>
+            <a:normAutofit/>
+          </a:bodyPr>
+          <a:lstStyle/>
+          <a:p>
+            <a:r>
+              <a:rPr lang="en-US" dirty="0"/>
               <a:t>As of August 25</a:t>
             </a:r>
             <a:r>
-              <a:rPr lang="en-US" baseline="30000" dirty="0" smtClean="0"/>
+              <a:rPr lang="en-US" baseline="30000" dirty="0"/>
               <a:t>th</a:t>
             </a:r>
             <a:r>
-              <a:rPr lang="en-US" dirty="0" smtClean="0"/>
+              <a:rPr lang="en-US" dirty="0"/>
               <a:t> </a:t>
             </a:r>
             <a:r>
-              <a:rPr lang="en-US" dirty="0" err="1" smtClean="0"/>
+              <a:rPr lang="en-US" dirty="0" err="1"/>
               <a:t>xxxxxxxxxxxx</a:t>
             </a:r>
             <a:r>
-              <a:rPr lang="en-US" dirty="0" smtClean="0"/>
+              <a:rPr lang="en-US" dirty="0"/>
               <a:t/>
             </a:r>
             <a:br>
-              <a:rPr lang="en-US" dirty="0" smtClean="0"/>
+              <a:rPr lang="en-US" dirty="0"/>
             </a:br>
             <a:r>
-              <a:rPr lang="en-US" dirty="0" smtClean="0"/>
+              <a:rPr lang="en-US" dirty="0"/>
               <a:t>will be located at Mission Bernal Campus in the:</a:t>
             </a:r>
             <a:br>
-              <a:rPr lang="en-US" dirty="0" smtClean="0"/>
+              <a:rPr lang="en-US" dirty="0"/>
             </a:br>
-            <a:endParaRPr lang="en-US" sz="1050" dirty="0" smtClean="0"/>
-          </a:p>
-          <a:p>
-            <a:r>
-              <a:rPr lang="en-US" dirty="0" err="1" smtClean="0"/>
+            <a:endParaRPr lang="en-US" sz="1400" dirty="0"/>
+          </a:p>
+          <a:p>
+            <a:r>
+              <a:rPr lang="en-US" b="1" dirty="0" err="1"/>
               <a:t>Monteagle</a:t>
             </a:r>
             <a:r>
-              <a:rPr lang="en-US" dirty="0" smtClean="0"/>
+              <a:rPr lang="en-US" b="1" dirty="0"/>
               <a:t> Building</a:t>
             </a:r>
             <a:br>
-              <a:rPr lang="en-US" dirty="0" smtClean="0"/>
+              <a:rPr lang="en-US" b="1" dirty="0"/>
             </a:br>
             <a:r>
-              <a:rPr lang="en-US" dirty="0" smtClean="0"/>
+              <a:rPr lang="en-US" sz="2400" dirty="0"/>
+              <a:t>1580 Valencia Street</a:t>
+            </a:r>
+            <a:br>
+              <a:rPr lang="en-US" sz="2400" dirty="0"/>
+            </a:br>
+            <a:r>
+              <a:rPr lang="en-US" sz="2400" dirty="0"/>
               <a:t>Floor X, </a:t>
             </a:r>
             <a:br>
-              <a:rPr lang="en-US" dirty="0" smtClean="0"/>
+              <a:rPr lang="en-US" sz="2400" dirty="0"/>
             </a:br>
             <a:r>
-              <a:rPr lang="en-US" dirty="0" smtClean="0"/>
+              <a:rPr lang="en-US" sz="2400" dirty="0"/>
               <a:t>Room XXX</a:t>
             </a:r>
-            <a:endParaRPr lang="en-US" dirty="0"/>
-          </a:p>
-        </p:txBody>
-      </p:sp>
-      <p:sp>
-        <p:nvSpPr>
-          <p:cNvPr id="32" name="Title 7"/>
-          <p:cNvSpPr txBox="1">
-            <a:spLocks/>
-          </p:cNvSpPr>
-          <p:nvPr/>
-        </p:nvSpPr>
-        <p:spPr>
-          <a:xfrm>
-            <a:off x="691174" y="363416"/>
-            <a:ext cx="5357935" cy="1080721"/>
-          </a:xfrm>
-          <a:prstGeom prst="rect">
-            <a:avLst/>
-          </a:prstGeom>
-        </p:spPr>
-        <p:txBody>
-          <a:bodyPr/>
-          <a:lstStyle>
-            <a:lvl1pPr algn="l" defTabSz="914400" rtl="0" eaLnBrk="1" latinLnBrk="0" hangingPunct="1">
-              <a:lnSpc>
-                <a:spcPct val="90000"/>
-              </a:lnSpc>
-              <a:spcBef>
-                <a:spcPct val="0"/>
-              </a:spcBef>
-              <a:buNone/>
-              <a:defRPr sz="5400" b="1" kern="1200">
-                <a:solidFill>
-                  <a:srgbClr val="00AAA0"/>
-                </a:solidFill>
-                <a:latin typeface="+mj-lt"/>
-                <a:ea typeface="+mj-ea"/>
-                <a:cs typeface="+mj-cs"/>
-              </a:defRPr>
-            </a:lvl1pPr>
-          </a:lstStyle>
-          <a:p>
-            <a:r>
-              <a:rPr lang="en-US" smtClean="0"/>
-              <a:t>We’re Moving</a:t>
-            </a:r>
-            <a:endParaRPr lang="en-US" dirty="0"/>
+            <a:endParaRPr lang="en-US" sz="2400" dirty="0"/>
           </a:p>
         </p:txBody>
       </p:sp>
@@ -6962,8 +6746,8 @@
         </p:blipFill>
         <p:spPr>
           <a:xfrm>
-            <a:off x="661674" y="61417"/>
-            <a:ext cx="11124872" cy="6758987"/>
+            <a:off x="661674" y="306082"/>
+            <a:ext cx="10357308" cy="6292649"/>
           </a:xfrm>
           <a:prstGeom prst="rect">
             <a:avLst/>
@@ -7353,8 +7137,8 @@
         </p:nvSpPr>
         <p:spPr>
           <a:xfrm>
-            <a:off x="8062473" y="115888"/>
-            <a:ext cx="4158987" cy="566737"/>
+            <a:off x="8032750" y="115888"/>
+            <a:ext cx="4159250" cy="566737"/>
           </a:xfrm>
         </p:spPr>
         <p:txBody>

</xml_diff>